<commit_message>
added snaphot package and edited readme
</commit_message>
<xml_diff>
--- a/Step7/Step7-AppInsights2.pptx
+++ b/Step7/Step7-AppInsights2.pptx
@@ -5,20 +5,12 @@
     <p:sldMasterId id="2147483732" r:id="rId1"/>
   </p:sldMasterIdLst>
   <p:notesMasterIdLst>
-    <p:notesMasterId r:id="rId13"/>
+    <p:notesMasterId r:id="rId5"/>
   </p:notesMasterIdLst>
   <p:sldIdLst>
     <p:sldId id="636" r:id="rId2"/>
     <p:sldId id="635" r:id="rId3"/>
-    <p:sldId id="639" r:id="rId4"/>
-    <p:sldId id="638" r:id="rId5"/>
-    <p:sldId id="642" r:id="rId6"/>
-    <p:sldId id="644" r:id="rId7"/>
-    <p:sldId id="640" r:id="rId8"/>
-    <p:sldId id="641" r:id="rId9"/>
-    <p:sldId id="643" r:id="rId10"/>
-    <p:sldId id="637" r:id="rId11"/>
-    <p:sldId id="604" r:id="rId12"/>
+    <p:sldId id="604" r:id="rId4"/>
   </p:sldIdLst>
   <p:sldSz cx="12192000" cy="6858000"/>
   <p:notesSz cx="7010400" cy="9296400"/>
@@ -124,14 +116,6 @@
           <p14:sldIdLst>
             <p14:sldId id="636"/>
             <p14:sldId id="635"/>
-            <p14:sldId id="639"/>
-            <p14:sldId id="638"/>
-            <p14:sldId id="642"/>
-            <p14:sldId id="644"/>
-            <p14:sldId id="640"/>
-            <p14:sldId id="641"/>
-            <p14:sldId id="643"/>
-            <p14:sldId id="637"/>
           </p14:sldIdLst>
         </p14:section>
         <p14:section name="Exit" id="{26D33BE0-B19C-465D-8801-1598009CC099}">
@@ -256,7 +240,7 @@
           <a:p>
             <a:fld id="{9EB326D8-4C38-4835-91AB-B79CDC0B07B3}" type="datetimeFigureOut">
               <a:rPr lang="en-US" smtClean="0"/>
-              <a:t>3/24/2018</a:t>
+              <a:t>4/9/2018</a:t>
             </a:fld>
             <a:endParaRPr lang="en-US"/>
           </a:p>
@@ -588,7 +572,7 @@
           <a:p>
             <a:fld id="{2C52CFDC-D2D5-4B9F-BA75-89F771E01AEB}" type="slidenum">
               <a:rPr lang="en-US" smtClean="0"/>
-              <a:t>11</a:t>
+              <a:t>3</a:t>
             </a:fld>
             <a:endParaRPr lang="en-US"/>
           </a:p>
@@ -6525,15 +6509,11 @@
           <a:p>
             <a:r>
               <a:rPr lang="en-US" b="1" dirty="0"/>
-              <a:t>Step 6</a:t>
+              <a:t>Step 7</a:t>
             </a:r>
             <a:br>
               <a:rPr lang="en-US" b="1" dirty="0"/>
             </a:br>
-            <a:r>
-              <a:rPr lang="fr-CA" b="1" dirty="0"/>
-              <a:t>App Service Tools</a:t>
-            </a:r>
             <a:endParaRPr lang="en-US" b="1" dirty="0"/>
           </a:p>
         </p:txBody>
@@ -6585,13 +6565,13 @@
           <a:p>
             <a:r>
               <a:rPr lang="en-CA" sz="3921" b="1" dirty="0"/>
-              <a:t>Guy Barrette</a:t>
+              <a:t>Mathieu Richard</a:t>
             </a:r>
           </a:p>
           <a:p>
             <a:r>
               <a:rPr lang="en-CA" sz="3921" b="1" dirty="0"/>
-              <a:t>Azure MVP, Freelance Dev</a:t>
+              <a:t>ASP.NET MVP, GSOFT.com</a:t>
             </a:r>
           </a:p>
           <a:p>
@@ -6600,17 +6580,7 @@
           <a:p>
             <a:r>
               <a:rPr lang="en-CA" sz="3921" b="1" dirty="0"/>
-              <a:t>GuyBarrette.me</a:t>
-            </a:r>
-          </a:p>
-          <a:p>
-            <a:r>
-              <a:rPr lang="fr-CA" sz="3921" b="1" dirty="0"/>
-              <a:t>A</a:t>
-            </a:r>
-            <a:r>
-              <a:rPr lang="en-CA" sz="3921" b="1" dirty="0"/>
-              <a:t>zureRocks.com</a:t>
+              <a:t>matrichard.com</a:t>
             </a:r>
           </a:p>
         </p:txBody>
@@ -6619,228 +6589,6 @@
     <p:extLst>
       <p:ext uri="{BB962C8B-B14F-4D97-AF65-F5344CB8AC3E}">
         <p14:creationId xmlns:p14="http://schemas.microsoft.com/office/powerpoint/2010/main" val="3475257736"/>
-      </p:ext>
-    </p:extLst>
-  </p:cSld>
-  <p:clrMapOvr>
-    <a:masterClrMapping/>
-  </p:clrMapOvr>
-  <p:transition>
-    <p:fade/>
-  </p:transition>
-</p:sld>
-</file>
-
-<file path=ppt/slides/slide10.xml><?xml version="1.0" encoding="utf-8"?>
-<p:sld xmlns:a="http://schemas.openxmlformats.org/drawingml/2006/main" xmlns:r="http://schemas.openxmlformats.org/officeDocument/2006/relationships" xmlns:p="http://schemas.openxmlformats.org/presentationml/2006/main">
-  <p:cSld>
-    <p:spTree>
-      <p:nvGrpSpPr>
-        <p:cNvPr id="1" name=""/>
-        <p:cNvGrpSpPr/>
-        <p:nvPr/>
-      </p:nvGrpSpPr>
-      <p:grpSpPr>
-        <a:xfrm>
-          <a:off x="0" y="0"/>
-          <a:ext cx="0" cy="0"/>
-          <a:chOff x="0" y="0"/>
-          <a:chExt cx="0" cy="0"/>
-        </a:xfrm>
-      </p:grpSpPr>
-      <p:pic>
-        <p:nvPicPr>
-          <p:cNvPr id="1026" name="Picture 2" descr="Image result for warning">
-            <a:extLst>
-              <a:ext uri="{FF2B5EF4-FFF2-40B4-BE49-F238E27FC236}">
-                <a16:creationId xmlns:a16="http://schemas.microsoft.com/office/drawing/2014/main" id="{D382161D-E550-4FBA-B7AD-EE1133BC43AF}"/>
-              </a:ext>
-            </a:extLst>
-          </p:cNvPr>
-          <p:cNvPicPr>
-            <a:picLocks noChangeAspect="1" noChangeArrowheads="1"/>
-          </p:cNvPicPr>
-          <p:nvPr/>
-        </p:nvPicPr>
-        <p:blipFill>
-          <a:blip r:embed="rId2" cstate="print">
-            <a:duotone>
-              <a:prstClr val="black"/>
-              <a:schemeClr val="tx2">
-                <a:tint val="45000"/>
-                <a:satMod val="400000"/>
-              </a:schemeClr>
-            </a:duotone>
-            <a:extLst>
-              <a:ext uri="{28A0092B-C50C-407E-A947-70E740481C1C}">
-                <a14:useLocalDpi xmlns:a14="http://schemas.microsoft.com/office/drawing/2010/main" val="0"/>
-              </a:ext>
-            </a:extLst>
-          </a:blip>
-          <a:srcRect/>
-          <a:stretch>
-            <a:fillRect/>
-          </a:stretch>
-        </p:blipFill>
-        <p:spPr bwMode="auto">
-          <a:xfrm>
-            <a:off x="911225" y="0"/>
-            <a:ext cx="10369550" cy="6858000"/>
-          </a:xfrm>
-          <a:prstGeom prst="rect">
-            <a:avLst/>
-          </a:prstGeom>
-          <a:noFill/>
-          <a:extLst>
-            <a:ext uri="{909E8E84-426E-40DD-AFC4-6F175D3DCCD1}">
-              <a14:hiddenFill xmlns:a14="http://schemas.microsoft.com/office/drawing/2010/main">
-                <a:solidFill>
-                  <a:srgbClr val="FFFFFF"/>
-                </a:solidFill>
-              </a14:hiddenFill>
-            </a:ext>
-          </a:extLst>
-        </p:spPr>
-      </p:pic>
-    </p:spTree>
-    <p:extLst>
-      <p:ext uri="{BB962C8B-B14F-4D97-AF65-F5344CB8AC3E}">
-        <p14:creationId xmlns:p14="http://schemas.microsoft.com/office/powerpoint/2010/main" val="911079467"/>
-      </p:ext>
-    </p:extLst>
-  </p:cSld>
-  <p:clrMapOvr>
-    <a:masterClrMapping/>
-  </p:clrMapOvr>
-  <p:transition>
-    <p:fade/>
-  </p:transition>
-</p:sld>
-</file>
-
-<file path=ppt/slides/slide11.xml><?xml version="1.0" encoding="utf-8"?>
-<p:sld xmlns:a="http://schemas.openxmlformats.org/drawingml/2006/main" xmlns:r="http://schemas.openxmlformats.org/officeDocument/2006/relationships" xmlns:p="http://schemas.openxmlformats.org/presentationml/2006/main">
-  <p:cSld>
-    <p:spTree>
-      <p:nvGrpSpPr>
-        <p:cNvPr id="1" name=""/>
-        <p:cNvGrpSpPr/>
-        <p:nvPr/>
-      </p:nvGrpSpPr>
-      <p:grpSpPr>
-        <a:xfrm>
-          <a:off x="0" y="0"/>
-          <a:ext cx="0" cy="0"/>
-          <a:chOff x="0" y="0"/>
-          <a:chExt cx="0" cy="0"/>
-        </a:xfrm>
-      </p:grpSpPr>
-      <p:sp>
-        <p:nvSpPr>
-          <p:cNvPr id="5" name="Text Placeholder 4"/>
-          <p:cNvSpPr>
-            <a:spLocks noGrp="1"/>
-          </p:cNvSpPr>
-          <p:nvPr>
-            <p:ph type="body" sz="quarter" idx="10"/>
-          </p:nvPr>
-        </p:nvSpPr>
-        <p:spPr>
-          <a:xfrm>
-            <a:off x="589800" y="1429230"/>
-            <a:ext cx="9310688" cy="5220596"/>
-          </a:xfrm>
-        </p:spPr>
-        <p:txBody>
-          <a:bodyPr/>
-          <a:lstStyle/>
-          <a:p>
-            <a:pPr marL="571500" indent="-571500">
-              <a:buFont typeface="Arial" panose="020B0604020202020204" pitchFamily="34" charset="0"/>
-              <a:buChar char="•"/>
-            </a:pPr>
-            <a:r>
-              <a:rPr lang="en-CA" dirty="0">
-                <a:hlinkClick r:id="rId3"/>
-              </a:rPr>
-              <a:t>How to configure remote debugging for Web Apps &amp; Visual Studio 2017</a:t>
-            </a:r>
-            <a:endParaRPr lang="en-US" dirty="0"/>
-          </a:p>
-          <a:p>
-            <a:pPr marL="571500" indent="-571500">
-              <a:buFont typeface="Arial" panose="020B0604020202020204" pitchFamily="34" charset="0"/>
-              <a:buChar char="•"/>
-            </a:pPr>
-            <a:endParaRPr lang="en-US" dirty="0"/>
-          </a:p>
-          <a:p>
-            <a:pPr marL="571500" indent="-571500">
-              <a:buFont typeface="Arial" panose="020B0604020202020204" pitchFamily="34" charset="0"/>
-              <a:buChar char="•"/>
-            </a:pPr>
-            <a:endParaRPr lang="en-US" dirty="0"/>
-          </a:p>
-          <a:p>
-            <a:endParaRPr lang="en-US" dirty="0"/>
-          </a:p>
-          <a:p>
-            <a:endParaRPr lang="en-US" dirty="0"/>
-          </a:p>
-          <a:p>
-            <a:endParaRPr lang="en-US" dirty="0"/>
-          </a:p>
-          <a:p>
-            <a:endParaRPr lang="en-US" dirty="0"/>
-          </a:p>
-        </p:txBody>
-      </p:sp>
-      <p:sp>
-        <p:nvSpPr>
-          <p:cNvPr id="2" name="TextBox 1"/>
-          <p:cNvSpPr txBox="1"/>
-          <p:nvPr/>
-        </p:nvSpPr>
-        <p:spPr>
-          <a:xfrm>
-            <a:off x="589800" y="242596"/>
-            <a:ext cx="8684829" cy="1311128"/>
-          </a:xfrm>
-          <a:prstGeom prst="rect">
-            <a:avLst/>
-          </a:prstGeom>
-          <a:noFill/>
-        </p:spPr>
-        <p:txBody>
-          <a:bodyPr wrap="square" lIns="182880" tIns="146304" rIns="182880" bIns="146304" rtlCol="0">
-            <a:spAutoFit/>
-          </a:bodyPr>
-          <a:lstStyle/>
-          <a:p>
-            <a:r>
-              <a:rPr lang="en-US" sz="6600" dirty="0">
-                <a:solidFill>
-                  <a:schemeClr val="bg1"/>
-                </a:solidFill>
-                <a:latin typeface="+mj-lt"/>
-              </a:rPr>
-              <a:t>References</a:t>
-            </a:r>
-            <a:r>
-              <a:rPr lang="en-US" sz="6600" dirty="0">
-                <a:solidFill>
-                  <a:schemeClr val="bg1"/>
-                </a:solidFill>
-              </a:rPr>
-              <a:t>:</a:t>
-            </a:r>
-          </a:p>
-        </p:txBody>
-      </p:sp>
-    </p:spTree>
-    <p:extLst>
-      <p:ext uri="{BB962C8B-B14F-4D97-AF65-F5344CB8AC3E}">
-        <p14:creationId xmlns:p14="http://schemas.microsoft.com/office/powerpoint/2010/main" val="1301198229"/>
       </p:ext>
     </p:extLst>
   </p:cSld>
@@ -6952,13 +6700,13 @@
           <a:p>
             <a:r>
               <a:rPr lang="en-CA" sz="3921" dirty="0"/>
-              <a:t>Remote debug and </a:t>
+              <a:t>Debug a production app </a:t>
             </a:r>
           </a:p>
           <a:p>
             <a:r>
               <a:rPr lang="en-CA" sz="3921" dirty="0"/>
-              <a:t>making changes in production</a:t>
+              <a:t>from exception snapshot</a:t>
             </a:r>
           </a:p>
         </p:txBody>
@@ -6998,604 +6746,119 @@
       </p:grpSpPr>
       <p:sp>
         <p:nvSpPr>
-          <p:cNvPr id="3" name="Title 2">
-            <a:extLst>
-              <a:ext uri="{FF2B5EF4-FFF2-40B4-BE49-F238E27FC236}">
-                <a16:creationId xmlns:a16="http://schemas.microsoft.com/office/drawing/2014/main" id="{B128FB58-C0B0-4CF5-A9E4-81B34B6DFC21}"/>
-              </a:ext>
-            </a:extLst>
-          </p:cNvPr>
+          <p:cNvPr id="5" name="Text Placeholder 4"/>
           <p:cNvSpPr>
             <a:spLocks noGrp="1"/>
           </p:cNvSpPr>
           <p:nvPr>
-            <p:ph type="ctrTitle"/>
+            <p:ph type="body" sz="quarter" idx="10"/>
           </p:nvPr>
         </p:nvSpPr>
         <p:spPr>
           <a:xfrm>
-            <a:off x="734888" y="1263781"/>
-            <a:ext cx="10722224" cy="1266359"/>
+            <a:off x="589800" y="1429230"/>
+            <a:ext cx="9310688" cy="5220596"/>
           </a:xfrm>
         </p:spPr>
         <p:txBody>
           <a:bodyPr/>
           <a:lstStyle/>
           <a:p>
+            <a:pPr marL="571500" indent="-571500">
+              <a:buFont typeface="Arial" panose="020B0604020202020204" pitchFamily="34" charset="0"/>
+              <a:buChar char="•"/>
+            </a:pPr>
             <a:r>
-              <a:rPr lang="fr-CA" dirty="0"/>
-              <a:t>I have a bug </a:t>
+              <a:rPr lang="en-CA" dirty="0">
+                <a:hlinkClick r:id="rId3"/>
+              </a:rPr>
+              <a:t>Debug snapshots on exceptions in .NET apps</a:t>
+            </a:r>
+            <a:endParaRPr lang="en-CA" dirty="0"/>
+          </a:p>
+          <a:p>
+            <a:pPr marL="571500" indent="-571500">
+              <a:buFont typeface="Arial" panose="020B0604020202020204" pitchFamily="34" charset="0"/>
+              <a:buChar char="•"/>
+            </a:pPr>
+            <a:r>
+              <a:rPr lang="en-CA" dirty="0">
+                <a:hlinkClick r:id="rId4" action="ppaction://hlinkfile"/>
+              </a:rPr>
+              <a:t>Debug live ASP.NET Azure apps using the Snapshot Debugger</a:t>
+            </a:r>
+            <a:endParaRPr lang="en-CA" dirty="0"/>
+          </a:p>
+          <a:p>
+            <a:endParaRPr lang="en-US" dirty="0"/>
+          </a:p>
+          <a:p>
+            <a:pPr marL="571500" indent="-571500">
+              <a:buFont typeface="Arial" panose="020B0604020202020204" pitchFamily="34" charset="0"/>
+              <a:buChar char="•"/>
+            </a:pPr>
+            <a:endParaRPr lang="en-US" dirty="0"/>
+          </a:p>
+          <a:p>
+            <a:endParaRPr lang="en-US" dirty="0"/>
+          </a:p>
+          <a:p>
+            <a:endParaRPr lang="en-US" dirty="0"/>
+          </a:p>
+          <a:p>
+            <a:endParaRPr lang="en-US" dirty="0"/>
+          </a:p>
+          <a:p>
+            <a:endParaRPr lang="en-US" dirty="0"/>
+          </a:p>
+        </p:txBody>
+      </p:sp>
+      <p:sp>
+        <p:nvSpPr>
+          <p:cNvPr id="2" name="TextBox 1"/>
+          <p:cNvSpPr txBox="1"/>
+          <p:nvPr/>
+        </p:nvSpPr>
+        <p:spPr>
+          <a:xfrm>
+            <a:off x="589800" y="242596"/>
+            <a:ext cx="8684829" cy="1311128"/>
+          </a:xfrm>
+          <a:prstGeom prst="rect">
+            <a:avLst/>
+          </a:prstGeom>
+          <a:noFill/>
+        </p:spPr>
+        <p:txBody>
+          <a:bodyPr wrap="square" lIns="182880" tIns="146304" rIns="182880" bIns="146304" rtlCol="0">
+            <a:spAutoFit/>
+          </a:bodyPr>
+          <a:lstStyle/>
+          <a:p>
+            <a:r>
+              <a:rPr lang="en-US" sz="6600" dirty="0">
+                <a:solidFill>
+                  <a:schemeClr val="bg1"/>
+                </a:solidFill>
+                <a:latin typeface="+mj-lt"/>
+              </a:rPr>
+              <a:t>References</a:t>
             </a:r>
             <a:r>
-              <a:rPr lang="fr-CA" dirty="0" err="1"/>
-              <a:t>that</a:t>
+              <a:rPr lang="en-US" sz="6600" dirty="0">
+                <a:solidFill>
+                  <a:schemeClr val="bg1"/>
+                </a:solidFill>
+              </a:rPr>
+              <a:t>:</a:t>
             </a:r>
-            <a:r>
-              <a:rPr lang="fr-CA" dirty="0"/>
-              <a:t> </a:t>
-            </a:r>
-            <a:r>
-              <a:rPr lang="fr-CA" dirty="0" err="1"/>
-              <a:t>only</a:t>
-            </a:r>
-            <a:r>
-              <a:rPr lang="fr-CA" dirty="0"/>
-              <a:t> </a:t>
-            </a:r>
-            <a:r>
-              <a:rPr lang="fr-CA" dirty="0" err="1"/>
-              <a:t>appears</a:t>
-            </a:r>
-            <a:r>
-              <a:rPr lang="fr-CA" dirty="0"/>
-              <a:t> </a:t>
-            </a:r>
-            <a:r>
-              <a:rPr lang="fr-CA" dirty="0" err="1"/>
-              <a:t>when</a:t>
-            </a:r>
-            <a:r>
-              <a:rPr lang="fr-CA" dirty="0"/>
-              <a:t> the app </a:t>
-            </a:r>
-            <a:r>
-              <a:rPr lang="fr-CA" dirty="0" err="1"/>
-              <a:t>is</a:t>
-            </a:r>
-            <a:r>
-              <a:rPr lang="fr-CA" dirty="0"/>
-              <a:t> </a:t>
-            </a:r>
-            <a:r>
-              <a:rPr lang="fr-CA" dirty="0" err="1"/>
-              <a:t>deployed</a:t>
-            </a:r>
-            <a:r>
-              <a:rPr lang="fr-CA" dirty="0"/>
-              <a:t> in Azure</a:t>
-            </a:r>
-            <a:endParaRPr lang="en-CA" dirty="0"/>
           </a:p>
         </p:txBody>
       </p:sp>
     </p:spTree>
     <p:extLst>
       <p:ext uri="{BB962C8B-B14F-4D97-AF65-F5344CB8AC3E}">
-        <p14:creationId xmlns:p14="http://schemas.microsoft.com/office/powerpoint/2010/main" val="256293206"/>
-      </p:ext>
-    </p:extLst>
-  </p:cSld>
-  <p:clrMapOvr>
-    <a:masterClrMapping/>
-  </p:clrMapOvr>
-  <p:transition>
-    <p:fade/>
-  </p:transition>
-</p:sld>
-</file>
-
-<file path=ppt/slides/slide4.xml><?xml version="1.0" encoding="utf-8"?>
-<p:sld xmlns:a="http://schemas.openxmlformats.org/drawingml/2006/main" xmlns:r="http://schemas.openxmlformats.org/officeDocument/2006/relationships" xmlns:p="http://schemas.openxmlformats.org/presentationml/2006/main">
-  <p:cSld>
-    <p:spTree>
-      <p:nvGrpSpPr>
-        <p:cNvPr id="1" name=""/>
-        <p:cNvGrpSpPr/>
-        <p:nvPr/>
-      </p:nvGrpSpPr>
-      <p:grpSpPr>
-        <a:xfrm>
-          <a:off x="0" y="0"/>
-          <a:ext cx="0" cy="0"/>
-          <a:chOff x="0" y="0"/>
-          <a:chExt cx="0" cy="0"/>
-        </a:xfrm>
-      </p:grpSpPr>
-      <p:sp>
-        <p:nvSpPr>
-          <p:cNvPr id="3" name="Title 2">
-            <a:extLst>
-              <a:ext uri="{FF2B5EF4-FFF2-40B4-BE49-F238E27FC236}">
-                <a16:creationId xmlns:a16="http://schemas.microsoft.com/office/drawing/2014/main" id="{B128FB58-C0B0-4CF5-A9E4-81B34B6DFC21}"/>
-              </a:ext>
-            </a:extLst>
-          </p:cNvPr>
-          <p:cNvSpPr>
-            <a:spLocks noGrp="1"/>
-          </p:cNvSpPr>
-          <p:nvPr>
-            <p:ph type="ctrTitle"/>
-          </p:nvPr>
-        </p:nvSpPr>
-        <p:spPr>
-          <a:xfrm>
-            <a:off x="734888" y="1263781"/>
-            <a:ext cx="10722224" cy="1266359"/>
-          </a:xfrm>
-        </p:spPr>
-        <p:txBody>
-          <a:bodyPr/>
-          <a:lstStyle/>
-          <a:p>
-            <a:r>
-              <a:rPr lang="fr-CA" dirty="0" err="1"/>
-              <a:t>I’d</a:t>
-            </a:r>
-            <a:r>
-              <a:rPr lang="fr-CA" dirty="0"/>
-              <a:t> like to </a:t>
-            </a:r>
-            <a:r>
-              <a:rPr lang="fr-CA" dirty="0" err="1"/>
-              <a:t>attach</a:t>
-            </a:r>
-            <a:r>
-              <a:rPr lang="fr-CA" dirty="0"/>
-              <a:t> the Visual Studio debugger to the process running in Azure</a:t>
-            </a:r>
-            <a:endParaRPr lang="en-CA" dirty="0"/>
-          </a:p>
-        </p:txBody>
-      </p:sp>
-    </p:spTree>
-    <p:extLst>
-      <p:ext uri="{BB962C8B-B14F-4D97-AF65-F5344CB8AC3E}">
-        <p14:creationId xmlns:p14="http://schemas.microsoft.com/office/powerpoint/2010/main" val="2149680239"/>
-      </p:ext>
-    </p:extLst>
-  </p:cSld>
-  <p:clrMapOvr>
-    <a:masterClrMapping/>
-  </p:clrMapOvr>
-  <p:transition>
-    <p:fade/>
-  </p:transition>
-</p:sld>
-</file>
-
-<file path=ppt/slides/slide5.xml><?xml version="1.0" encoding="utf-8"?>
-<p:sld xmlns:a="http://schemas.openxmlformats.org/drawingml/2006/main" xmlns:r="http://schemas.openxmlformats.org/officeDocument/2006/relationships" xmlns:p="http://schemas.openxmlformats.org/presentationml/2006/main">
-  <p:cSld>
-    <p:spTree>
-      <p:nvGrpSpPr>
-        <p:cNvPr id="1" name=""/>
-        <p:cNvGrpSpPr/>
-        <p:nvPr/>
-      </p:nvGrpSpPr>
-      <p:grpSpPr>
-        <a:xfrm>
-          <a:off x="0" y="0"/>
-          <a:ext cx="0" cy="0"/>
-          <a:chOff x="0" y="0"/>
-          <a:chExt cx="0" cy="0"/>
-        </a:xfrm>
-      </p:grpSpPr>
-      <p:sp>
-        <p:nvSpPr>
-          <p:cNvPr id="3" name="Title 2">
-            <a:extLst>
-              <a:ext uri="{FF2B5EF4-FFF2-40B4-BE49-F238E27FC236}">
-                <a16:creationId xmlns:a16="http://schemas.microsoft.com/office/drawing/2014/main" id="{B128FB58-C0B0-4CF5-A9E4-81B34B6DFC21}"/>
-              </a:ext>
-            </a:extLst>
-          </p:cNvPr>
-          <p:cNvSpPr>
-            <a:spLocks noGrp="1"/>
-          </p:cNvSpPr>
-          <p:nvPr>
-            <p:ph type="ctrTitle"/>
-          </p:nvPr>
-        </p:nvSpPr>
-        <p:spPr>
-          <a:xfrm>
-            <a:off x="734888" y="1263781"/>
-            <a:ext cx="10722224" cy="1266359"/>
-          </a:xfrm>
-        </p:spPr>
-        <p:txBody>
-          <a:bodyPr/>
-          <a:lstStyle/>
-          <a:p>
-            <a:r>
-              <a:rPr lang="fr-CA" dirty="0"/>
-              <a:t>Solution</a:t>
-            </a:r>
-            <a:br>
-              <a:rPr lang="fr-CA" dirty="0"/>
-            </a:br>
-            <a:br>
-              <a:rPr lang="fr-CA" dirty="0"/>
-            </a:br>
-            <a:r>
-              <a:rPr lang="fr-CA" dirty="0" err="1"/>
-              <a:t>Remote</a:t>
-            </a:r>
-            <a:r>
-              <a:rPr lang="fr-CA" dirty="0"/>
-              <a:t> </a:t>
-            </a:r>
-            <a:r>
-              <a:rPr lang="fr-CA" dirty="0" err="1"/>
-              <a:t>Debugging</a:t>
-            </a:r>
-            <a:endParaRPr lang="en-CA" dirty="0"/>
-          </a:p>
-        </p:txBody>
-      </p:sp>
-    </p:spTree>
-    <p:extLst>
-      <p:ext uri="{BB962C8B-B14F-4D97-AF65-F5344CB8AC3E}">
-        <p14:creationId xmlns:p14="http://schemas.microsoft.com/office/powerpoint/2010/main" val="621437709"/>
-      </p:ext>
-    </p:extLst>
-  </p:cSld>
-  <p:clrMapOvr>
-    <a:masterClrMapping/>
-  </p:clrMapOvr>
-  <p:transition>
-    <p:fade/>
-  </p:transition>
-</p:sld>
-</file>
-
-<file path=ppt/slides/slide6.xml><?xml version="1.0" encoding="utf-8"?>
-<p:sld xmlns:a="http://schemas.openxmlformats.org/drawingml/2006/main" xmlns:r="http://schemas.openxmlformats.org/officeDocument/2006/relationships" xmlns:p="http://schemas.openxmlformats.org/presentationml/2006/main">
-  <p:cSld>
-    <p:spTree>
-      <p:nvGrpSpPr>
-        <p:cNvPr id="1" name=""/>
-        <p:cNvGrpSpPr/>
-        <p:nvPr/>
-      </p:nvGrpSpPr>
-      <p:grpSpPr>
-        <a:xfrm>
-          <a:off x="0" y="0"/>
-          <a:ext cx="0" cy="0"/>
-          <a:chOff x="0" y="0"/>
-          <a:chExt cx="0" cy="0"/>
-        </a:xfrm>
-      </p:grpSpPr>
-      <p:pic>
-        <p:nvPicPr>
-          <p:cNvPr id="1026" name="Picture 2" descr="Image result for warning">
-            <a:extLst>
-              <a:ext uri="{FF2B5EF4-FFF2-40B4-BE49-F238E27FC236}">
-                <a16:creationId xmlns:a16="http://schemas.microsoft.com/office/drawing/2014/main" id="{D382161D-E550-4FBA-B7AD-EE1133BC43AF}"/>
-              </a:ext>
-            </a:extLst>
-          </p:cNvPr>
-          <p:cNvPicPr>
-            <a:picLocks noChangeAspect="1" noChangeArrowheads="1"/>
-          </p:cNvPicPr>
-          <p:nvPr/>
-        </p:nvPicPr>
-        <p:blipFill>
-          <a:blip r:embed="rId2" cstate="print">
-            <a:duotone>
-              <a:prstClr val="black"/>
-              <a:schemeClr val="tx2">
-                <a:tint val="45000"/>
-                <a:satMod val="400000"/>
-              </a:schemeClr>
-            </a:duotone>
-            <a:extLst>
-              <a:ext uri="{28A0092B-C50C-407E-A947-70E740481C1C}">
-                <a14:useLocalDpi xmlns:a14="http://schemas.microsoft.com/office/drawing/2010/main" val="0"/>
-              </a:ext>
-            </a:extLst>
-          </a:blip>
-          <a:srcRect/>
-          <a:stretch>
-            <a:fillRect/>
-          </a:stretch>
-        </p:blipFill>
-        <p:spPr bwMode="auto">
-          <a:xfrm>
-            <a:off x="911225" y="0"/>
-            <a:ext cx="10369550" cy="6858000"/>
-          </a:xfrm>
-          <a:prstGeom prst="rect">
-            <a:avLst/>
-          </a:prstGeom>
-          <a:noFill/>
-          <a:extLst>
-            <a:ext uri="{909E8E84-426E-40DD-AFC4-6F175D3DCCD1}">
-              <a14:hiddenFill xmlns:a14="http://schemas.microsoft.com/office/drawing/2010/main">
-                <a:solidFill>
-                  <a:srgbClr val="FFFFFF"/>
-                </a:solidFill>
-              </a14:hiddenFill>
-            </a:ext>
-          </a:extLst>
-        </p:spPr>
-      </p:pic>
-    </p:spTree>
-    <p:extLst>
-      <p:ext uri="{BB962C8B-B14F-4D97-AF65-F5344CB8AC3E}">
-        <p14:creationId xmlns:p14="http://schemas.microsoft.com/office/powerpoint/2010/main" val="1475784916"/>
-      </p:ext>
-    </p:extLst>
-  </p:cSld>
-  <p:clrMapOvr>
-    <a:masterClrMapping/>
-  </p:clrMapOvr>
-  <p:transition>
-    <p:fade/>
-  </p:transition>
-</p:sld>
-</file>
-
-<file path=ppt/slides/slide7.xml><?xml version="1.0" encoding="utf-8"?>
-<p:sld xmlns:a="http://schemas.openxmlformats.org/drawingml/2006/main" xmlns:r="http://schemas.openxmlformats.org/officeDocument/2006/relationships" xmlns:p="http://schemas.openxmlformats.org/presentationml/2006/main">
-  <p:cSld>
-    <p:spTree>
-      <p:nvGrpSpPr>
-        <p:cNvPr id="1" name=""/>
-        <p:cNvGrpSpPr/>
-        <p:nvPr/>
-      </p:nvGrpSpPr>
-      <p:grpSpPr>
-        <a:xfrm>
-          <a:off x="0" y="0"/>
-          <a:ext cx="0" cy="0"/>
-          <a:chOff x="0" y="0"/>
-          <a:chExt cx="0" cy="0"/>
-        </a:xfrm>
-      </p:grpSpPr>
-      <p:sp>
-        <p:nvSpPr>
-          <p:cNvPr id="3" name="Title 2">
-            <a:extLst>
-              <a:ext uri="{FF2B5EF4-FFF2-40B4-BE49-F238E27FC236}">
-                <a16:creationId xmlns:a16="http://schemas.microsoft.com/office/drawing/2014/main" id="{B128FB58-C0B0-4CF5-A9E4-81B34B6DFC21}"/>
-              </a:ext>
-            </a:extLst>
-          </p:cNvPr>
-          <p:cNvSpPr>
-            <a:spLocks noGrp="1"/>
-          </p:cNvSpPr>
-          <p:nvPr>
-            <p:ph type="ctrTitle"/>
-          </p:nvPr>
-        </p:nvSpPr>
-        <p:spPr>
-          <a:xfrm>
-            <a:off x="734888" y="1263781"/>
-            <a:ext cx="10722224" cy="1266359"/>
-          </a:xfrm>
-        </p:spPr>
-        <p:txBody>
-          <a:bodyPr/>
-          <a:lstStyle/>
-          <a:p>
-            <a:r>
-              <a:rPr lang="fr-CA" dirty="0" err="1"/>
-              <a:t>It’s</a:t>
-            </a:r>
-            <a:r>
-              <a:rPr lang="fr-CA" dirty="0"/>
-              <a:t> </a:t>
-            </a:r>
-            <a:r>
-              <a:rPr lang="fr-CA" dirty="0" err="1"/>
-              <a:t>late</a:t>
-            </a:r>
-            <a:r>
-              <a:rPr lang="fr-CA" dirty="0"/>
-              <a:t> at night on a Saturday and I </a:t>
-            </a:r>
-            <a:r>
-              <a:rPr lang="fr-CA" dirty="0" err="1"/>
-              <a:t>need</a:t>
-            </a:r>
-            <a:r>
-              <a:rPr lang="fr-CA" dirty="0"/>
-              <a:t> to fix a bug in production</a:t>
-            </a:r>
-            <a:endParaRPr lang="en-CA" dirty="0"/>
-          </a:p>
-        </p:txBody>
-      </p:sp>
-    </p:spTree>
-    <p:extLst>
-      <p:ext uri="{BB962C8B-B14F-4D97-AF65-F5344CB8AC3E}">
-        <p14:creationId xmlns:p14="http://schemas.microsoft.com/office/powerpoint/2010/main" val="3771063185"/>
-      </p:ext>
-    </p:extLst>
-  </p:cSld>
-  <p:clrMapOvr>
-    <a:masterClrMapping/>
-  </p:clrMapOvr>
-  <p:transition>
-    <p:fade/>
-  </p:transition>
-</p:sld>
-</file>
-
-<file path=ppt/slides/slide8.xml><?xml version="1.0" encoding="utf-8"?>
-<p:sld xmlns:a="http://schemas.openxmlformats.org/drawingml/2006/main" xmlns:r="http://schemas.openxmlformats.org/officeDocument/2006/relationships" xmlns:p="http://schemas.openxmlformats.org/presentationml/2006/main">
-  <p:cSld>
-    <p:spTree>
-      <p:nvGrpSpPr>
-        <p:cNvPr id="1" name=""/>
-        <p:cNvGrpSpPr/>
-        <p:nvPr/>
-      </p:nvGrpSpPr>
-      <p:grpSpPr>
-        <a:xfrm>
-          <a:off x="0" y="0"/>
-          <a:ext cx="0" cy="0"/>
-          <a:chOff x="0" y="0"/>
-          <a:chExt cx="0" cy="0"/>
-        </a:xfrm>
-      </p:grpSpPr>
-      <p:sp>
-        <p:nvSpPr>
-          <p:cNvPr id="3" name="Title 2">
-            <a:extLst>
-              <a:ext uri="{FF2B5EF4-FFF2-40B4-BE49-F238E27FC236}">
-                <a16:creationId xmlns:a16="http://schemas.microsoft.com/office/drawing/2014/main" id="{B128FB58-C0B0-4CF5-A9E4-81B34B6DFC21}"/>
-              </a:ext>
-            </a:extLst>
-          </p:cNvPr>
-          <p:cNvSpPr>
-            <a:spLocks noGrp="1"/>
-          </p:cNvSpPr>
-          <p:nvPr>
-            <p:ph type="ctrTitle"/>
-          </p:nvPr>
-        </p:nvSpPr>
-        <p:spPr>
-          <a:xfrm>
-            <a:off x="734888" y="1263781"/>
-            <a:ext cx="10722224" cy="1266359"/>
-          </a:xfrm>
-        </p:spPr>
-        <p:txBody>
-          <a:bodyPr/>
-          <a:lstStyle/>
-          <a:p>
-            <a:r>
-              <a:rPr lang="fr-CA" dirty="0"/>
-              <a:t>I </a:t>
-            </a:r>
-            <a:r>
-              <a:rPr lang="fr-CA" dirty="0" err="1"/>
-              <a:t>don’t</a:t>
-            </a:r>
-            <a:r>
-              <a:rPr lang="fr-CA" dirty="0"/>
-              <a:t> have </a:t>
-            </a:r>
-            <a:r>
-              <a:rPr lang="fr-CA" dirty="0" err="1"/>
-              <a:t>my</a:t>
-            </a:r>
-            <a:r>
-              <a:rPr lang="fr-CA" dirty="0"/>
-              <a:t> laptop and </a:t>
-            </a:r>
-            <a:r>
-              <a:rPr lang="fr-CA" dirty="0" err="1"/>
-              <a:t>I’d</a:t>
-            </a:r>
-            <a:r>
-              <a:rPr lang="fr-CA" dirty="0"/>
-              <a:t> like to </a:t>
-            </a:r>
-            <a:r>
-              <a:rPr lang="fr-CA" dirty="0" err="1"/>
-              <a:t>make</a:t>
-            </a:r>
-            <a:r>
-              <a:rPr lang="fr-CA" dirty="0"/>
-              <a:t> a quick change</a:t>
-            </a:r>
-            <a:endParaRPr lang="en-CA" dirty="0"/>
-          </a:p>
-        </p:txBody>
-      </p:sp>
-    </p:spTree>
-    <p:extLst>
-      <p:ext uri="{BB962C8B-B14F-4D97-AF65-F5344CB8AC3E}">
-        <p14:creationId xmlns:p14="http://schemas.microsoft.com/office/powerpoint/2010/main" val="149217816"/>
-      </p:ext>
-    </p:extLst>
-  </p:cSld>
-  <p:clrMapOvr>
-    <a:masterClrMapping/>
-  </p:clrMapOvr>
-  <p:transition>
-    <p:fade/>
-  </p:transition>
-</p:sld>
-</file>
-
-<file path=ppt/slides/slide9.xml><?xml version="1.0" encoding="utf-8"?>
-<p:sld xmlns:a="http://schemas.openxmlformats.org/drawingml/2006/main" xmlns:r="http://schemas.openxmlformats.org/officeDocument/2006/relationships" xmlns:p="http://schemas.openxmlformats.org/presentationml/2006/main">
-  <p:cSld>
-    <p:spTree>
-      <p:nvGrpSpPr>
-        <p:cNvPr id="1" name=""/>
-        <p:cNvGrpSpPr/>
-        <p:nvPr/>
-      </p:nvGrpSpPr>
-      <p:grpSpPr>
-        <a:xfrm>
-          <a:off x="0" y="0"/>
-          <a:ext cx="0" cy="0"/>
-          <a:chOff x="0" y="0"/>
-          <a:chExt cx="0" cy="0"/>
-        </a:xfrm>
-      </p:grpSpPr>
-      <p:sp>
-        <p:nvSpPr>
-          <p:cNvPr id="3" name="Title 2">
-            <a:extLst>
-              <a:ext uri="{FF2B5EF4-FFF2-40B4-BE49-F238E27FC236}">
-                <a16:creationId xmlns:a16="http://schemas.microsoft.com/office/drawing/2014/main" id="{B128FB58-C0B0-4CF5-A9E4-81B34B6DFC21}"/>
-              </a:ext>
-            </a:extLst>
-          </p:cNvPr>
-          <p:cNvSpPr>
-            <a:spLocks noGrp="1"/>
-          </p:cNvSpPr>
-          <p:nvPr>
-            <p:ph type="ctrTitle"/>
-          </p:nvPr>
-        </p:nvSpPr>
-        <p:spPr>
-          <a:xfrm>
-            <a:off x="734888" y="1263781"/>
-            <a:ext cx="10722224" cy="1266359"/>
-          </a:xfrm>
-        </p:spPr>
-        <p:txBody>
-          <a:bodyPr/>
-          <a:lstStyle/>
-          <a:p>
-            <a:r>
-              <a:rPr lang="fr-CA" dirty="0"/>
-              <a:t>Solution</a:t>
-            </a:r>
-            <a:br>
-              <a:rPr lang="fr-CA" dirty="0"/>
-            </a:br>
-            <a:br>
-              <a:rPr lang="fr-CA" dirty="0"/>
-            </a:br>
-            <a:r>
-              <a:rPr lang="fr-CA" dirty="0"/>
-              <a:t>Kudu Tools and App Service Editor (Monaco)</a:t>
-            </a:r>
-            <a:endParaRPr lang="en-CA" dirty="0"/>
-          </a:p>
-        </p:txBody>
-      </p:sp>
-    </p:spTree>
-    <p:extLst>
-      <p:ext uri="{BB962C8B-B14F-4D97-AF65-F5344CB8AC3E}">
-        <p14:creationId xmlns:p14="http://schemas.microsoft.com/office/powerpoint/2010/main" val="2284931901"/>
+        <p14:creationId xmlns:p14="http://schemas.microsoft.com/office/powerpoint/2010/main" val="1301198229"/>
       </p:ext>
     </p:extLst>
   </p:cSld>

</xml_diff>

<commit_message>
fix typo and finish of slides
</commit_message>
<xml_diff>
--- a/Step7/Step7-AppInsights2.pptx
+++ b/Step7/Step7-AppInsights2.pptx
@@ -5,12 +5,17 @@
     <p:sldMasterId id="2147483732" r:id="rId1"/>
   </p:sldMasterIdLst>
   <p:notesMasterIdLst>
-    <p:notesMasterId r:id="rId5"/>
+    <p:notesMasterId r:id="rId10"/>
   </p:notesMasterIdLst>
   <p:sldIdLst>
     <p:sldId id="636" r:id="rId2"/>
     <p:sldId id="635" r:id="rId3"/>
-    <p:sldId id="604" r:id="rId4"/>
+    <p:sldId id="637" r:id="rId4"/>
+    <p:sldId id="644" r:id="rId5"/>
+    <p:sldId id="645" r:id="rId6"/>
+    <p:sldId id="646" r:id="rId7"/>
+    <p:sldId id="647" r:id="rId8"/>
+    <p:sldId id="604" r:id="rId9"/>
   </p:sldIdLst>
   <p:sldSz cx="12192000" cy="6858000"/>
   <p:notesSz cx="7010400" cy="9296400"/>
@@ -116,6 +121,11 @@
           <p14:sldIdLst>
             <p14:sldId id="636"/>
             <p14:sldId id="635"/>
+            <p14:sldId id="637"/>
+            <p14:sldId id="644"/>
+            <p14:sldId id="645"/>
+            <p14:sldId id="646"/>
+            <p14:sldId id="647"/>
           </p14:sldIdLst>
         </p14:section>
         <p14:section name="Exit" id="{26D33BE0-B19C-465D-8801-1598009CC099}">
@@ -240,7 +250,7 @@
           <a:p>
             <a:fld id="{9EB326D8-4C38-4835-91AB-B79CDC0B07B3}" type="datetimeFigureOut">
               <a:rPr lang="en-US" smtClean="0"/>
-              <a:t>4/9/2018</a:t>
+              <a:t>4/19/2018</a:t>
             </a:fld>
             <a:endParaRPr lang="en-US"/>
           </a:p>
@@ -551,7 +561,119 @@
           <a:bodyPr/>
           <a:lstStyle/>
           <a:p>
-            <a:endParaRPr lang="fr-CA" dirty="0"/>
+            <a:r>
+              <a:rPr lang="fr-CA" dirty="0"/>
+              <a:t>Not blocking like </a:t>
+            </a:r>
+            <a:r>
+              <a:rPr lang="fr-CA" dirty="0" err="1"/>
+              <a:t>steps</a:t>
+            </a:r>
+            <a:r>
+              <a:rPr lang="fr-CA" dirty="0"/>
+              <a:t> 6</a:t>
+            </a:r>
+          </a:p>
+          <a:p>
+            <a:r>
+              <a:rPr lang="fr-CA" dirty="0"/>
+              <a:t>Stack trace </a:t>
+            </a:r>
+            <a:r>
+              <a:rPr lang="fr-CA" dirty="0" err="1"/>
+              <a:t>with</a:t>
+            </a:r>
+            <a:r>
+              <a:rPr lang="fr-CA" dirty="0"/>
+              <a:t> Local values </a:t>
+            </a:r>
+            <a:r>
+              <a:rPr lang="fr-CA" dirty="0" err="1"/>
+              <a:t>captured</a:t>
+            </a:r>
+            <a:r>
+              <a:rPr lang="fr-CA" dirty="0"/>
+              <a:t> (</a:t>
+            </a:r>
+            <a:r>
+              <a:rPr lang="fr-CA" dirty="0" err="1"/>
+              <a:t>parameters</a:t>
+            </a:r>
+            <a:r>
+              <a:rPr lang="fr-CA" dirty="0"/>
+              <a:t> and variables)</a:t>
+            </a:r>
+          </a:p>
+          <a:p>
+            <a:r>
+              <a:rPr lang="fr-CA" dirty="0"/>
+              <a:t>Snapshot </a:t>
+            </a:r>
+            <a:r>
+              <a:rPr lang="fr-CA" dirty="0" err="1"/>
+              <a:t>is</a:t>
+            </a:r>
+            <a:r>
+              <a:rPr lang="fr-CA" dirty="0"/>
+              <a:t> </a:t>
+            </a:r>
+            <a:r>
+              <a:rPr lang="fr-CA" dirty="0" err="1"/>
+              <a:t>viewable</a:t>
+            </a:r>
+            <a:r>
+              <a:rPr lang="fr-CA" dirty="0"/>
+              <a:t> </a:t>
+            </a:r>
+            <a:r>
+              <a:rPr lang="fr-CA" dirty="0" err="1"/>
+              <a:t>from</a:t>
+            </a:r>
+            <a:r>
+              <a:rPr lang="fr-CA" dirty="0"/>
+              <a:t> the portal and can </a:t>
+            </a:r>
+            <a:r>
+              <a:rPr lang="fr-CA" dirty="0" err="1"/>
+              <a:t>be</a:t>
+            </a:r>
+            <a:r>
+              <a:rPr lang="fr-CA" dirty="0"/>
+              <a:t> </a:t>
+            </a:r>
+            <a:r>
+              <a:rPr lang="fr-CA" dirty="0" err="1"/>
+              <a:t>downloaded</a:t>
+            </a:r>
+            <a:r>
+              <a:rPr lang="fr-CA" dirty="0"/>
+              <a:t> to </a:t>
+            </a:r>
+            <a:r>
+              <a:rPr lang="fr-CA" dirty="0" err="1"/>
+              <a:t>be</a:t>
+            </a:r>
+            <a:r>
+              <a:rPr lang="fr-CA" dirty="0"/>
+              <a:t> </a:t>
+            </a:r>
+            <a:r>
+              <a:rPr lang="fr-CA" dirty="0" err="1"/>
+              <a:t>viewed</a:t>
+            </a:r>
+            <a:r>
+              <a:rPr lang="fr-CA" dirty="0"/>
+              <a:t> in </a:t>
+            </a:r>
+            <a:r>
+              <a:rPr lang="fr-CA" b="1" dirty="0"/>
+              <a:t>VS2017 Enterprise</a:t>
+            </a:r>
+            <a:r>
+              <a:rPr lang="fr-CA" dirty="0"/>
+              <a:t> </a:t>
+            </a:r>
+            <a:endParaRPr lang="en-CA" dirty="0"/>
           </a:p>
         </p:txBody>
       </p:sp>
@@ -573,6 +695,533 @@
             <a:fld id="{2C52CFDC-D2D5-4B9F-BA75-89F771E01AEB}" type="slidenum">
               <a:rPr lang="en-US" smtClean="0"/>
               <a:t>3</a:t>
+            </a:fld>
+            <a:endParaRPr lang="en-US"/>
+          </a:p>
+        </p:txBody>
+      </p:sp>
+    </p:spTree>
+    <p:extLst>
+      <p:ext uri="{BB962C8B-B14F-4D97-AF65-F5344CB8AC3E}">
+        <p14:creationId xmlns:p14="http://schemas.microsoft.com/office/powerpoint/2010/main" val="704775393"/>
+      </p:ext>
+    </p:extLst>
+  </p:cSld>
+  <p:clrMapOvr>
+    <a:masterClrMapping/>
+  </p:clrMapOvr>
+</p:notes>
+</file>
+
+<file path=ppt/notesSlides/notesSlide2.xml><?xml version="1.0" encoding="utf-8"?>
+<p:notes xmlns:a="http://schemas.openxmlformats.org/drawingml/2006/main" xmlns:r="http://schemas.openxmlformats.org/officeDocument/2006/relationships" xmlns:p="http://schemas.openxmlformats.org/presentationml/2006/main">
+  <p:cSld>
+    <p:spTree>
+      <p:nvGrpSpPr>
+        <p:cNvPr id="1" name=""/>
+        <p:cNvGrpSpPr/>
+        <p:nvPr/>
+      </p:nvGrpSpPr>
+      <p:grpSpPr>
+        <a:xfrm>
+          <a:off x="0" y="0"/>
+          <a:ext cx="0" cy="0"/>
+          <a:chOff x="0" y="0"/>
+          <a:chExt cx="0" cy="0"/>
+        </a:xfrm>
+      </p:grpSpPr>
+      <p:sp>
+        <p:nvSpPr>
+          <p:cNvPr id="2" name="Slide Image Placeholder 1"/>
+          <p:cNvSpPr>
+            <a:spLocks noGrp="1" noRot="1" noChangeAspect="1"/>
+          </p:cNvSpPr>
+          <p:nvPr>
+            <p:ph type="sldImg"/>
+          </p:nvPr>
+        </p:nvSpPr>
+        <p:spPr/>
+      </p:sp>
+      <p:sp>
+        <p:nvSpPr>
+          <p:cNvPr id="3" name="Notes Placeholder 2"/>
+          <p:cNvSpPr>
+            <a:spLocks noGrp="1"/>
+          </p:cNvSpPr>
+          <p:nvPr>
+            <p:ph type="body" idx="1"/>
+          </p:nvPr>
+        </p:nvSpPr>
+        <p:spPr/>
+        <p:txBody>
+          <a:bodyPr/>
+          <a:lstStyle/>
+          <a:p>
+            <a:r>
+              <a:rPr lang="fr-CA" dirty="0"/>
+              <a:t>SNAPSHOT MAY CONTAIN SENSITIVE DATA SINCE PARAMETERS AND VARIABLES WILL BE CAPTURED</a:t>
+            </a:r>
+            <a:endParaRPr lang="en-CA" dirty="0"/>
+          </a:p>
+        </p:txBody>
+      </p:sp>
+      <p:sp>
+        <p:nvSpPr>
+          <p:cNvPr id="4" name="Slide Number Placeholder 3"/>
+          <p:cNvSpPr>
+            <a:spLocks noGrp="1"/>
+          </p:cNvSpPr>
+          <p:nvPr>
+            <p:ph type="sldNum" sz="quarter" idx="10"/>
+          </p:nvPr>
+        </p:nvSpPr>
+        <p:spPr/>
+        <p:txBody>
+          <a:bodyPr/>
+          <a:lstStyle/>
+          <a:p>
+            <a:fld id="{2C52CFDC-D2D5-4B9F-BA75-89F771E01AEB}" type="slidenum">
+              <a:rPr lang="en-US" smtClean="0"/>
+              <a:t>4</a:t>
+            </a:fld>
+            <a:endParaRPr lang="en-US"/>
+          </a:p>
+        </p:txBody>
+      </p:sp>
+    </p:spTree>
+    <p:extLst>
+      <p:ext uri="{BB962C8B-B14F-4D97-AF65-F5344CB8AC3E}">
+        <p14:creationId xmlns:p14="http://schemas.microsoft.com/office/powerpoint/2010/main" val="3308665011"/>
+      </p:ext>
+    </p:extLst>
+  </p:cSld>
+  <p:clrMapOvr>
+    <a:masterClrMapping/>
+  </p:clrMapOvr>
+</p:notes>
+</file>
+
+<file path=ppt/notesSlides/notesSlide3.xml><?xml version="1.0" encoding="utf-8"?>
+<p:notes xmlns:a="http://schemas.openxmlformats.org/drawingml/2006/main" xmlns:r="http://schemas.openxmlformats.org/officeDocument/2006/relationships" xmlns:p="http://schemas.openxmlformats.org/presentationml/2006/main">
+  <p:cSld>
+    <p:spTree>
+      <p:nvGrpSpPr>
+        <p:cNvPr id="1" name=""/>
+        <p:cNvGrpSpPr/>
+        <p:nvPr/>
+      </p:nvGrpSpPr>
+      <p:grpSpPr>
+        <a:xfrm>
+          <a:off x="0" y="0"/>
+          <a:ext cx="0" cy="0"/>
+          <a:chOff x="0" y="0"/>
+          <a:chExt cx="0" cy="0"/>
+        </a:xfrm>
+      </p:grpSpPr>
+      <p:sp>
+        <p:nvSpPr>
+          <p:cNvPr id="2" name="Slide Image Placeholder 1"/>
+          <p:cNvSpPr>
+            <a:spLocks noGrp="1" noRot="1" noChangeAspect="1"/>
+          </p:cNvSpPr>
+          <p:nvPr>
+            <p:ph type="sldImg"/>
+          </p:nvPr>
+        </p:nvSpPr>
+        <p:spPr/>
+      </p:sp>
+      <p:sp>
+        <p:nvSpPr>
+          <p:cNvPr id="3" name="Notes Placeholder 2"/>
+          <p:cNvSpPr>
+            <a:spLocks noGrp="1"/>
+          </p:cNvSpPr>
+          <p:nvPr>
+            <p:ph type="body" idx="1"/>
+          </p:nvPr>
+        </p:nvSpPr>
+        <p:spPr/>
+        <p:txBody>
+          <a:bodyPr/>
+          <a:lstStyle/>
+          <a:p>
+            <a:r>
+              <a:rPr lang="fr-CA" dirty="0"/>
+              <a:t>No more </a:t>
+            </a:r>
+            <a:r>
+              <a:rPr lang="en-CA" dirty="0"/>
+              <a:t>“It runs fast on my machine”</a:t>
+            </a:r>
+          </a:p>
+          <a:p>
+            <a:r>
+              <a:rPr lang="en-CA" dirty="0"/>
+              <a:t>Profile for “free” and always running on production</a:t>
+            </a:r>
+          </a:p>
+        </p:txBody>
+      </p:sp>
+      <p:sp>
+        <p:nvSpPr>
+          <p:cNvPr id="4" name="Slide Number Placeholder 3"/>
+          <p:cNvSpPr>
+            <a:spLocks noGrp="1"/>
+          </p:cNvSpPr>
+          <p:nvPr>
+            <p:ph type="sldNum" sz="quarter" idx="10"/>
+          </p:nvPr>
+        </p:nvSpPr>
+        <p:spPr/>
+        <p:txBody>
+          <a:bodyPr/>
+          <a:lstStyle/>
+          <a:p>
+            <a:fld id="{2C52CFDC-D2D5-4B9F-BA75-89F771E01AEB}" type="slidenum">
+              <a:rPr lang="en-US" smtClean="0"/>
+              <a:t>5</a:t>
+            </a:fld>
+            <a:endParaRPr lang="en-US"/>
+          </a:p>
+        </p:txBody>
+      </p:sp>
+    </p:spTree>
+    <p:extLst>
+      <p:ext uri="{BB962C8B-B14F-4D97-AF65-F5344CB8AC3E}">
+        <p14:creationId xmlns:p14="http://schemas.microsoft.com/office/powerpoint/2010/main" val="3692611850"/>
+      </p:ext>
+    </p:extLst>
+  </p:cSld>
+  <p:clrMapOvr>
+    <a:masterClrMapping/>
+  </p:clrMapOvr>
+</p:notes>
+</file>
+
+<file path=ppt/notesSlides/notesSlide4.xml><?xml version="1.0" encoding="utf-8"?>
+<p:notes xmlns:a="http://schemas.openxmlformats.org/drawingml/2006/main" xmlns:r="http://schemas.openxmlformats.org/officeDocument/2006/relationships" xmlns:p="http://schemas.openxmlformats.org/presentationml/2006/main">
+  <p:cSld>
+    <p:spTree>
+      <p:nvGrpSpPr>
+        <p:cNvPr id="1" name=""/>
+        <p:cNvGrpSpPr/>
+        <p:nvPr/>
+      </p:nvGrpSpPr>
+      <p:grpSpPr>
+        <a:xfrm>
+          <a:off x="0" y="0"/>
+          <a:ext cx="0" cy="0"/>
+          <a:chOff x="0" y="0"/>
+          <a:chExt cx="0" cy="0"/>
+        </a:xfrm>
+      </p:grpSpPr>
+      <p:sp>
+        <p:nvSpPr>
+          <p:cNvPr id="2" name="Slide Image Placeholder 1"/>
+          <p:cNvSpPr>
+            <a:spLocks noGrp="1" noRot="1" noChangeAspect="1"/>
+          </p:cNvSpPr>
+          <p:nvPr>
+            <p:ph type="sldImg"/>
+          </p:nvPr>
+        </p:nvSpPr>
+        <p:spPr/>
+      </p:sp>
+      <p:sp>
+        <p:nvSpPr>
+          <p:cNvPr id="3" name="Notes Placeholder 2"/>
+          <p:cNvSpPr>
+            <a:spLocks noGrp="1"/>
+          </p:cNvSpPr>
+          <p:nvPr>
+            <p:ph type="body" idx="1"/>
+          </p:nvPr>
+        </p:nvSpPr>
+        <p:spPr/>
+        <p:txBody>
+          <a:bodyPr/>
+          <a:lstStyle/>
+          <a:p>
+            <a:pPr marL="0" marR="0" lvl="0" indent="0" algn="l" defTabSz="914400" rtl="0" eaLnBrk="1" fontAlgn="auto" latinLnBrk="0" hangingPunct="1">
+              <a:lnSpc>
+                <a:spcPct val="100000"/>
+              </a:lnSpc>
+              <a:spcBef>
+                <a:spcPts val="0"/>
+              </a:spcBef>
+              <a:spcAft>
+                <a:spcPts val="0"/>
+              </a:spcAft>
+              <a:buClrTx/>
+              <a:buSzTx/>
+              <a:buFontTx/>
+              <a:buNone/>
+              <a:tabLst/>
+              <a:defRPr/>
+            </a:pPr>
+            <a:r>
+              <a:rPr lang="en-CA" i="1" dirty="0" err="1"/>
+              <a:t>SideNote</a:t>
+            </a:r>
+            <a:r>
+              <a:rPr lang="en-CA" i="1" dirty="0"/>
+              <a:t>: since it will most probably necessitate the installation of tools in Visual Studio and in the </a:t>
+            </a:r>
+            <a:r>
+              <a:rPr lang="en-CA" i="1" dirty="0" err="1"/>
+              <a:t>webapp</a:t>
+            </a:r>
+            <a:r>
+              <a:rPr lang="en-CA" i="1" dirty="0"/>
+              <a:t> some restart of VS and the </a:t>
+            </a:r>
+            <a:r>
+              <a:rPr lang="en-CA" i="1" dirty="0" err="1"/>
+              <a:t>webapp</a:t>
+            </a:r>
+            <a:r>
+              <a:rPr lang="en-CA" i="1" dirty="0"/>
+              <a:t> may be need</a:t>
+            </a:r>
+          </a:p>
+          <a:p>
+            <a:r>
+              <a:rPr lang="en-CA" dirty="0"/>
+              <a:t>Enables non blocking debugging in production</a:t>
+            </a:r>
+          </a:p>
+          <a:p>
+            <a:r>
+              <a:rPr lang="en-CA" dirty="0"/>
+              <a:t>Captures value in </a:t>
+            </a:r>
+            <a:r>
+              <a:rPr lang="en-CA" dirty="0" err="1"/>
+              <a:t>realtime</a:t>
+            </a:r>
+            <a:r>
+              <a:rPr lang="en-CA" dirty="0"/>
+              <a:t> from traffic to your site</a:t>
+            </a:r>
+          </a:p>
+          <a:p>
+            <a:r>
+              <a:rPr lang="en-CA" dirty="0"/>
+              <a:t>As with the other debugger … it must be the same code deployed and on your machine</a:t>
+            </a:r>
+          </a:p>
+          <a:p>
+            <a:r>
+              <a:rPr lang="en-CA" dirty="0"/>
+              <a:t>With multiple </a:t>
+            </a:r>
+            <a:r>
+              <a:rPr lang="en-CA" dirty="0" err="1"/>
+              <a:t>snappoint</a:t>
+            </a:r>
+            <a:r>
+              <a:rPr lang="en-CA" dirty="0"/>
+              <a:t> (breakpoint) the debugger ensures that corresponding capture are from the same end user session</a:t>
+            </a:r>
+          </a:p>
+          <a:p>
+            <a:r>
+              <a:rPr lang="en-CA" dirty="0"/>
+              <a:t>Even if many users are on your site</a:t>
+            </a:r>
+          </a:p>
+        </p:txBody>
+      </p:sp>
+      <p:sp>
+        <p:nvSpPr>
+          <p:cNvPr id="4" name="Slide Number Placeholder 3"/>
+          <p:cNvSpPr>
+            <a:spLocks noGrp="1"/>
+          </p:cNvSpPr>
+          <p:nvPr>
+            <p:ph type="sldNum" sz="quarter" idx="10"/>
+          </p:nvPr>
+        </p:nvSpPr>
+        <p:spPr/>
+        <p:txBody>
+          <a:bodyPr/>
+          <a:lstStyle/>
+          <a:p>
+            <a:fld id="{2C52CFDC-D2D5-4B9F-BA75-89F771E01AEB}" type="slidenum">
+              <a:rPr lang="en-US" smtClean="0"/>
+              <a:t>6</a:t>
+            </a:fld>
+            <a:endParaRPr lang="en-US"/>
+          </a:p>
+        </p:txBody>
+      </p:sp>
+    </p:spTree>
+    <p:extLst>
+      <p:ext uri="{BB962C8B-B14F-4D97-AF65-F5344CB8AC3E}">
+        <p14:creationId xmlns:p14="http://schemas.microsoft.com/office/powerpoint/2010/main" val="3938956461"/>
+      </p:ext>
+    </p:extLst>
+  </p:cSld>
+  <p:clrMapOvr>
+    <a:masterClrMapping/>
+  </p:clrMapOvr>
+</p:notes>
+</file>
+
+<file path=ppt/notesSlides/notesSlide5.xml><?xml version="1.0" encoding="utf-8"?>
+<p:notes xmlns:a="http://schemas.openxmlformats.org/drawingml/2006/main" xmlns:r="http://schemas.openxmlformats.org/officeDocument/2006/relationships" xmlns:p="http://schemas.openxmlformats.org/presentationml/2006/main">
+  <p:cSld>
+    <p:spTree>
+      <p:nvGrpSpPr>
+        <p:cNvPr id="1" name=""/>
+        <p:cNvGrpSpPr/>
+        <p:nvPr/>
+      </p:nvGrpSpPr>
+      <p:grpSpPr>
+        <a:xfrm>
+          <a:off x="0" y="0"/>
+          <a:ext cx="0" cy="0"/>
+          <a:chOff x="0" y="0"/>
+          <a:chExt cx="0" cy="0"/>
+        </a:xfrm>
+      </p:grpSpPr>
+      <p:sp>
+        <p:nvSpPr>
+          <p:cNvPr id="2" name="Slide Image Placeholder 1"/>
+          <p:cNvSpPr>
+            <a:spLocks noGrp="1" noRot="1" noChangeAspect="1"/>
+          </p:cNvSpPr>
+          <p:nvPr>
+            <p:ph type="sldImg"/>
+          </p:nvPr>
+        </p:nvSpPr>
+        <p:spPr/>
+      </p:sp>
+      <p:sp>
+        <p:nvSpPr>
+          <p:cNvPr id="3" name="Notes Placeholder 2"/>
+          <p:cNvSpPr>
+            <a:spLocks noGrp="1"/>
+          </p:cNvSpPr>
+          <p:nvPr>
+            <p:ph type="body" idx="1"/>
+          </p:nvPr>
+        </p:nvSpPr>
+        <p:spPr/>
+        <p:txBody>
+          <a:bodyPr/>
+          <a:lstStyle/>
+          <a:p>
+            <a:r>
+              <a:rPr lang="fr-CA" dirty="0"/>
+              <a:t>COLLECTED VALUES MAY CONTAIN SENSITIVE DATA SINCE PARAMETERS AND VARIABLES WILL BE CAPTURED</a:t>
+            </a:r>
+            <a:endParaRPr lang="en-CA" dirty="0"/>
+          </a:p>
+        </p:txBody>
+      </p:sp>
+      <p:sp>
+        <p:nvSpPr>
+          <p:cNvPr id="4" name="Slide Number Placeholder 3"/>
+          <p:cNvSpPr>
+            <a:spLocks noGrp="1"/>
+          </p:cNvSpPr>
+          <p:nvPr>
+            <p:ph type="sldNum" sz="quarter" idx="10"/>
+          </p:nvPr>
+        </p:nvSpPr>
+        <p:spPr/>
+        <p:txBody>
+          <a:bodyPr/>
+          <a:lstStyle/>
+          <a:p>
+            <a:fld id="{2C52CFDC-D2D5-4B9F-BA75-89F771E01AEB}" type="slidenum">
+              <a:rPr lang="en-US" smtClean="0"/>
+              <a:t>7</a:t>
+            </a:fld>
+            <a:endParaRPr lang="en-US"/>
+          </a:p>
+        </p:txBody>
+      </p:sp>
+    </p:spTree>
+    <p:extLst>
+      <p:ext uri="{BB962C8B-B14F-4D97-AF65-F5344CB8AC3E}">
+        <p14:creationId xmlns:p14="http://schemas.microsoft.com/office/powerpoint/2010/main" val="1692080117"/>
+      </p:ext>
+    </p:extLst>
+  </p:cSld>
+  <p:clrMapOvr>
+    <a:masterClrMapping/>
+  </p:clrMapOvr>
+</p:notes>
+</file>
+
+<file path=ppt/notesSlides/notesSlide6.xml><?xml version="1.0" encoding="utf-8"?>
+<p:notes xmlns:a="http://schemas.openxmlformats.org/drawingml/2006/main" xmlns:r="http://schemas.openxmlformats.org/officeDocument/2006/relationships" xmlns:p="http://schemas.openxmlformats.org/presentationml/2006/main">
+  <p:cSld>
+    <p:spTree>
+      <p:nvGrpSpPr>
+        <p:cNvPr id="1" name=""/>
+        <p:cNvGrpSpPr/>
+        <p:nvPr/>
+      </p:nvGrpSpPr>
+      <p:grpSpPr>
+        <a:xfrm>
+          <a:off x="0" y="0"/>
+          <a:ext cx="0" cy="0"/>
+          <a:chOff x="0" y="0"/>
+          <a:chExt cx="0" cy="0"/>
+        </a:xfrm>
+      </p:grpSpPr>
+      <p:sp>
+        <p:nvSpPr>
+          <p:cNvPr id="2" name="Slide Image Placeholder 1"/>
+          <p:cNvSpPr>
+            <a:spLocks noGrp="1" noRot="1" noChangeAspect="1"/>
+          </p:cNvSpPr>
+          <p:nvPr>
+            <p:ph type="sldImg"/>
+          </p:nvPr>
+        </p:nvSpPr>
+        <p:spPr/>
+      </p:sp>
+      <p:sp>
+        <p:nvSpPr>
+          <p:cNvPr id="3" name="Notes Placeholder 2"/>
+          <p:cNvSpPr>
+            <a:spLocks noGrp="1"/>
+          </p:cNvSpPr>
+          <p:nvPr>
+            <p:ph type="body" idx="1"/>
+          </p:nvPr>
+        </p:nvSpPr>
+        <p:spPr/>
+        <p:txBody>
+          <a:bodyPr/>
+          <a:lstStyle/>
+          <a:p>
+            <a:endParaRPr lang="fr-CA" dirty="0"/>
+          </a:p>
+        </p:txBody>
+      </p:sp>
+      <p:sp>
+        <p:nvSpPr>
+          <p:cNvPr id="4" name="Slide Number Placeholder 3"/>
+          <p:cNvSpPr>
+            <a:spLocks noGrp="1"/>
+          </p:cNvSpPr>
+          <p:nvPr>
+            <p:ph type="sldNum" sz="quarter" idx="10"/>
+          </p:nvPr>
+        </p:nvSpPr>
+        <p:spPr/>
+        <p:txBody>
+          <a:bodyPr/>
+          <a:lstStyle/>
+          <a:p>
+            <a:fld id="{2C52CFDC-D2D5-4B9F-BA75-89F771E01AEB}" type="slidenum">
+              <a:rPr lang="en-US" smtClean="0"/>
+              <a:t>8</a:t>
             </a:fld>
             <a:endParaRPr lang="en-US"/>
           </a:p>
@@ -6514,7 +7163,10 @@
             <a:br>
               <a:rPr lang="en-US" b="1" dirty="0"/>
             </a:br>
-            <a:endParaRPr lang="en-US" b="1" dirty="0"/>
+            <a:r>
+              <a:rPr lang="en-US" b="1" dirty="0"/>
+              <a:t>Application Insights 2</a:t>
+            </a:r>
           </a:p>
         </p:txBody>
       </p:sp>
@@ -6571,7 +7223,7 @@
           <a:p>
             <a:r>
               <a:rPr lang="en-CA" sz="3921" b="1" dirty="0"/>
-              <a:t>ASP.NET MVP, GSOFT.com</a:t>
+              <a:t>ASP.NET MVP, GSoft.com</a:t>
             </a:r>
           </a:p>
           <a:p>
@@ -6648,7 +7300,7 @@
           <a:p>
             <a:r>
               <a:rPr lang="en-US" b="1" dirty="0"/>
-              <a:t>Goal</a:t>
+              <a:t>Labs</a:t>
             </a:r>
           </a:p>
         </p:txBody>
@@ -6698,15 +7350,57 @@
             </a:lvl1pPr>
           </a:lstStyle>
           <a:p>
+            <a:pPr marL="742950" indent="-742950" algn="l">
+              <a:buFont typeface="+mj-lt"/>
+              <a:buAutoNum type="arabicPeriod"/>
+            </a:pPr>
+            <a:r>
+              <a:rPr lang="fr-CA" sz="3921" dirty="0"/>
+              <a:t>E</a:t>
+            </a:r>
+            <a:r>
+              <a:rPr lang="en-CA" sz="3921" dirty="0" err="1"/>
+              <a:t>xception</a:t>
+            </a:r>
             <a:r>
               <a:rPr lang="en-CA" sz="3921" dirty="0"/>
-              <a:t>Debug a production app </a:t>
-            </a:r>
-          </a:p>
-          <a:p>
+              <a:t> Snapshot</a:t>
+            </a:r>
+          </a:p>
+          <a:p>
+            <a:pPr marL="742950" indent="-742950" algn="l">
+              <a:buFont typeface="+mj-lt"/>
+              <a:buAutoNum type="arabicPeriod"/>
+            </a:pPr>
+            <a:r>
+              <a:rPr lang="fr-CA" sz="3921" dirty="0"/>
+              <a:t>A</a:t>
+            </a:r>
+            <a:r>
+              <a:rPr lang="en-CA" sz="3921" dirty="0" err="1"/>
+              <a:t>pplication</a:t>
+            </a:r>
             <a:r>
               <a:rPr lang="en-CA" sz="3921" dirty="0"/>
-              <a:t>from exception snapshot</a:t>
+              <a:t> Insights Profiler</a:t>
+            </a:r>
+          </a:p>
+          <a:p>
+            <a:pPr marL="742950" indent="-742950" algn="l">
+              <a:buFont typeface="+mj-lt"/>
+              <a:buAutoNum type="arabicPeriod"/>
+            </a:pPr>
+            <a:r>
+              <a:rPr lang="fr-CA" sz="3921" dirty="0"/>
+              <a:t>S</a:t>
+            </a:r>
+            <a:r>
+              <a:rPr lang="en-CA" sz="3921" dirty="0" err="1"/>
+              <a:t>napshot</a:t>
+            </a:r>
+            <a:r>
+              <a:rPr lang="en-CA" sz="3921" dirty="0"/>
+              <a:t> debugger (optional)</a:t>
             </a:r>
           </a:p>
         </p:txBody>
@@ -6728,6 +7422,589 @@
 </file>
 
 <file path=ppt/slides/slide3.xml><?xml version="1.0" encoding="utf-8"?>
+<p:sld xmlns:a="http://schemas.openxmlformats.org/drawingml/2006/main" xmlns:r="http://schemas.openxmlformats.org/officeDocument/2006/relationships" xmlns:p="http://schemas.openxmlformats.org/presentationml/2006/main">
+  <p:cSld>
+    <p:bg>
+      <p:bgPr>
+        <a:solidFill>
+          <a:srgbClr val="0072C6"/>
+        </a:solidFill>
+        <a:effectLst/>
+      </p:bgPr>
+    </p:bg>
+    <p:spTree>
+      <p:nvGrpSpPr>
+        <p:cNvPr id="1" name=""/>
+        <p:cNvGrpSpPr/>
+        <p:nvPr/>
+      </p:nvGrpSpPr>
+      <p:grpSpPr>
+        <a:xfrm>
+          <a:off x="0" y="0"/>
+          <a:ext cx="0" cy="0"/>
+          <a:chOff x="0" y="0"/>
+          <a:chExt cx="0" cy="0"/>
+        </a:xfrm>
+      </p:grpSpPr>
+      <p:sp>
+        <p:nvSpPr>
+          <p:cNvPr id="2" name="Title 1"/>
+          <p:cNvSpPr>
+            <a:spLocks noGrp="1"/>
+          </p:cNvSpPr>
+          <p:nvPr>
+            <p:ph type="ctrTitle"/>
+          </p:nvPr>
+        </p:nvSpPr>
+        <p:spPr>
+          <a:xfrm>
+            <a:off x="866856" y="889131"/>
+            <a:ext cx="10722224" cy="1195233"/>
+          </a:xfrm>
+        </p:spPr>
+        <p:txBody>
+          <a:bodyPr/>
+          <a:lstStyle/>
+          <a:p>
+            <a:r>
+              <a:rPr lang="fr-CA" dirty="0"/>
+              <a:t>E</a:t>
+            </a:r>
+            <a:r>
+              <a:rPr lang="en-CA" dirty="0" err="1"/>
+              <a:t>xception</a:t>
+            </a:r>
+            <a:r>
+              <a:rPr lang="en-CA" dirty="0"/>
+              <a:t> Snapshot</a:t>
+            </a:r>
+            <a:endParaRPr lang="en-US" b="1" dirty="0"/>
+          </a:p>
+        </p:txBody>
+      </p:sp>
+      <p:sp>
+        <p:nvSpPr>
+          <p:cNvPr id="3" name="Title 1"/>
+          <p:cNvSpPr txBox="1">
+            <a:spLocks/>
+          </p:cNvSpPr>
+          <p:nvPr/>
+        </p:nvSpPr>
+        <p:spPr>
+          <a:xfrm>
+            <a:off x="882435" y="2980788"/>
+            <a:ext cx="10722224" cy="3286892"/>
+          </a:xfrm>
+          <a:prstGeom prst="rect">
+            <a:avLst/>
+          </a:prstGeom>
+        </p:spPr>
+        <p:txBody>
+          <a:bodyPr>
+            <a:noAutofit/>
+          </a:bodyPr>
+          <a:lstStyle>
+            <a:lvl1pPr algn="ctr" defTabSz="932372" rtl="0" eaLnBrk="1" latinLnBrk="0" hangingPunct="1">
+              <a:lnSpc>
+                <a:spcPct val="90000"/>
+              </a:lnSpc>
+              <a:spcBef>
+                <a:spcPct val="0"/>
+              </a:spcBef>
+              <a:buNone/>
+              <a:defRPr lang="en-US" sz="8159" b="0" kern="1200" cap="none" spc="-102" baseline="0">
+                <a:ln w="3175">
+                  <a:noFill/>
+                </a:ln>
+                <a:solidFill>
+                  <a:schemeClr val="bg1"/>
+                </a:solidFill>
+                <a:effectLst/>
+                <a:latin typeface="+mj-lt"/>
+                <a:ea typeface="+mn-ea"/>
+                <a:cs typeface="Segoe UI" pitchFamily="34" charset="0"/>
+              </a:defRPr>
+            </a:lvl1pPr>
+          </a:lstStyle>
+          <a:p>
+            <a:r>
+              <a:rPr lang="fr-CA" sz="3921" dirty="0" err="1"/>
+              <a:t>Collect</a:t>
+            </a:r>
+            <a:r>
+              <a:rPr lang="fr-CA" sz="3921" dirty="0"/>
+              <a:t> data </a:t>
+            </a:r>
+            <a:r>
+              <a:rPr lang="fr-CA" sz="3921" dirty="0" err="1"/>
+              <a:t>sample</a:t>
+            </a:r>
+            <a:r>
+              <a:rPr lang="fr-CA" sz="3921" dirty="0"/>
+              <a:t> </a:t>
+            </a:r>
+            <a:r>
+              <a:rPr lang="fr-CA" sz="3921" dirty="0" err="1"/>
+              <a:t>when</a:t>
+            </a:r>
+            <a:r>
+              <a:rPr lang="fr-CA" sz="3921" dirty="0"/>
+              <a:t> exception </a:t>
+            </a:r>
+            <a:r>
+              <a:rPr lang="fr-CA" sz="3921" dirty="0" err="1"/>
+              <a:t>occur</a:t>
+            </a:r>
+            <a:endParaRPr lang="en-CA" sz="3921" dirty="0"/>
+          </a:p>
+        </p:txBody>
+      </p:sp>
+    </p:spTree>
+    <p:extLst>
+      <p:ext uri="{BB962C8B-B14F-4D97-AF65-F5344CB8AC3E}">
+        <p14:creationId xmlns:p14="http://schemas.microsoft.com/office/powerpoint/2010/main" val="3986757459"/>
+      </p:ext>
+    </p:extLst>
+  </p:cSld>
+  <p:clrMapOvr>
+    <a:masterClrMapping/>
+  </p:clrMapOvr>
+  <p:transition>
+    <p:fade/>
+  </p:transition>
+</p:sld>
+</file>
+
+<file path=ppt/slides/slide4.xml><?xml version="1.0" encoding="utf-8"?>
+<p:sld xmlns:a="http://schemas.openxmlformats.org/drawingml/2006/main" xmlns:r="http://schemas.openxmlformats.org/officeDocument/2006/relationships" xmlns:p="http://schemas.openxmlformats.org/presentationml/2006/main">
+  <p:cSld>
+    <p:spTree>
+      <p:nvGrpSpPr>
+        <p:cNvPr id="1" name=""/>
+        <p:cNvGrpSpPr/>
+        <p:nvPr/>
+      </p:nvGrpSpPr>
+      <p:grpSpPr>
+        <a:xfrm>
+          <a:off x="0" y="0"/>
+          <a:ext cx="0" cy="0"/>
+          <a:chOff x="0" y="0"/>
+          <a:chExt cx="0" cy="0"/>
+        </a:xfrm>
+      </p:grpSpPr>
+      <p:pic>
+        <p:nvPicPr>
+          <p:cNvPr id="1026" name="Picture 2" descr="Image result for warning">
+            <a:extLst>
+              <a:ext uri="{FF2B5EF4-FFF2-40B4-BE49-F238E27FC236}">
+                <a16:creationId xmlns:a16="http://schemas.microsoft.com/office/drawing/2014/main" id="{D382161D-E550-4FBA-B7AD-EE1133BC43AF}"/>
+              </a:ext>
+            </a:extLst>
+          </p:cNvPr>
+          <p:cNvPicPr>
+            <a:picLocks noChangeAspect="1" noChangeArrowheads="1"/>
+          </p:cNvPicPr>
+          <p:nvPr/>
+        </p:nvPicPr>
+        <p:blipFill>
+          <a:blip r:embed="rId3" cstate="print">
+            <a:duotone>
+              <a:prstClr val="black"/>
+              <a:schemeClr val="tx2">
+                <a:tint val="45000"/>
+                <a:satMod val="400000"/>
+              </a:schemeClr>
+            </a:duotone>
+            <a:extLst>
+              <a:ext uri="{28A0092B-C50C-407E-A947-70E740481C1C}">
+                <a14:useLocalDpi xmlns:a14="http://schemas.microsoft.com/office/drawing/2010/main" val="0"/>
+              </a:ext>
+            </a:extLst>
+          </a:blip>
+          <a:srcRect/>
+          <a:stretch>
+            <a:fillRect/>
+          </a:stretch>
+        </p:blipFill>
+        <p:spPr bwMode="auto">
+          <a:xfrm>
+            <a:off x="911225" y="0"/>
+            <a:ext cx="10369550" cy="6858000"/>
+          </a:xfrm>
+          <a:prstGeom prst="rect">
+            <a:avLst/>
+          </a:prstGeom>
+          <a:noFill/>
+          <a:extLst>
+            <a:ext uri="{909E8E84-426E-40DD-AFC4-6F175D3DCCD1}">
+              <a14:hiddenFill xmlns:a14="http://schemas.microsoft.com/office/drawing/2010/main">
+                <a:solidFill>
+                  <a:srgbClr val="FFFFFF"/>
+                </a:solidFill>
+              </a14:hiddenFill>
+            </a:ext>
+          </a:extLst>
+        </p:spPr>
+      </p:pic>
+    </p:spTree>
+    <p:extLst>
+      <p:ext uri="{BB962C8B-B14F-4D97-AF65-F5344CB8AC3E}">
+        <p14:creationId xmlns:p14="http://schemas.microsoft.com/office/powerpoint/2010/main" val="1475784916"/>
+      </p:ext>
+    </p:extLst>
+  </p:cSld>
+  <p:clrMapOvr>
+    <a:masterClrMapping/>
+  </p:clrMapOvr>
+  <p:transition>
+    <p:fade/>
+  </p:transition>
+</p:sld>
+</file>
+
+<file path=ppt/slides/slide5.xml><?xml version="1.0" encoding="utf-8"?>
+<p:sld xmlns:a="http://schemas.openxmlformats.org/drawingml/2006/main" xmlns:r="http://schemas.openxmlformats.org/officeDocument/2006/relationships" xmlns:p="http://schemas.openxmlformats.org/presentationml/2006/main">
+  <p:cSld>
+    <p:spTree>
+      <p:nvGrpSpPr>
+        <p:cNvPr id="1" name=""/>
+        <p:cNvGrpSpPr/>
+        <p:nvPr/>
+      </p:nvGrpSpPr>
+      <p:grpSpPr>
+        <a:xfrm>
+          <a:off x="0" y="0"/>
+          <a:ext cx="0" cy="0"/>
+          <a:chOff x="0" y="0"/>
+          <a:chExt cx="0" cy="0"/>
+        </a:xfrm>
+      </p:grpSpPr>
+      <p:sp>
+        <p:nvSpPr>
+          <p:cNvPr id="2" name="Title 1"/>
+          <p:cNvSpPr>
+            <a:spLocks noGrp="1"/>
+          </p:cNvSpPr>
+          <p:nvPr>
+            <p:ph type="ctrTitle"/>
+          </p:nvPr>
+        </p:nvSpPr>
+        <p:spPr>
+          <a:xfrm>
+            <a:off x="866856" y="889131"/>
+            <a:ext cx="10722224" cy="1195233"/>
+          </a:xfrm>
+        </p:spPr>
+        <p:txBody>
+          <a:bodyPr/>
+          <a:lstStyle/>
+          <a:p>
+            <a:r>
+              <a:rPr lang="fr-CA" b="1" dirty="0"/>
+              <a:t>AI Profiler</a:t>
+            </a:r>
+            <a:endParaRPr lang="en-US" b="1" dirty="0"/>
+          </a:p>
+        </p:txBody>
+      </p:sp>
+      <p:sp>
+        <p:nvSpPr>
+          <p:cNvPr id="3" name="Title 1"/>
+          <p:cNvSpPr txBox="1">
+            <a:spLocks/>
+          </p:cNvSpPr>
+          <p:nvPr/>
+        </p:nvSpPr>
+        <p:spPr>
+          <a:xfrm>
+            <a:off x="882435" y="2980788"/>
+            <a:ext cx="10722224" cy="3286892"/>
+          </a:xfrm>
+          <a:prstGeom prst="rect">
+            <a:avLst/>
+          </a:prstGeom>
+        </p:spPr>
+        <p:txBody>
+          <a:bodyPr>
+            <a:noAutofit/>
+          </a:bodyPr>
+          <a:lstStyle>
+            <a:lvl1pPr algn="ctr" defTabSz="932372" rtl="0" eaLnBrk="1" latinLnBrk="0" hangingPunct="1">
+              <a:lnSpc>
+                <a:spcPct val="90000"/>
+              </a:lnSpc>
+              <a:spcBef>
+                <a:spcPct val="0"/>
+              </a:spcBef>
+              <a:buNone/>
+              <a:defRPr lang="en-US" sz="8159" b="0" kern="1200" cap="none" spc="-102" baseline="0">
+                <a:ln w="3175">
+                  <a:noFill/>
+                </a:ln>
+                <a:solidFill>
+                  <a:schemeClr val="bg1"/>
+                </a:solidFill>
+                <a:effectLst/>
+                <a:latin typeface="+mj-lt"/>
+                <a:ea typeface="+mn-ea"/>
+                <a:cs typeface="Segoe UI" pitchFamily="34" charset="0"/>
+              </a:defRPr>
+            </a:lvl1pPr>
+          </a:lstStyle>
+          <a:p>
+            <a:r>
+              <a:rPr lang="fr-CA" sz="3921" dirty="0"/>
+              <a:t>Profiling a production App </a:t>
+            </a:r>
+            <a:r>
+              <a:rPr lang="fr-CA" sz="3921" dirty="0" err="1"/>
+              <a:t>from</a:t>
+            </a:r>
+            <a:r>
+              <a:rPr lang="fr-CA" sz="3921" dirty="0"/>
+              <a:t> </a:t>
+            </a:r>
+            <a:r>
+              <a:rPr lang="fr-CA" sz="3921" dirty="0" err="1"/>
+              <a:t>its</a:t>
+            </a:r>
+            <a:r>
+              <a:rPr lang="fr-CA" sz="3921" dirty="0"/>
+              <a:t> </a:t>
+            </a:r>
+            <a:r>
+              <a:rPr lang="fr-CA" sz="3921" dirty="0" err="1"/>
+              <a:t>environment</a:t>
+            </a:r>
+            <a:endParaRPr lang="en-CA" sz="3921" dirty="0"/>
+          </a:p>
+        </p:txBody>
+      </p:sp>
+    </p:spTree>
+    <p:extLst>
+      <p:ext uri="{BB962C8B-B14F-4D97-AF65-F5344CB8AC3E}">
+        <p14:creationId xmlns:p14="http://schemas.microsoft.com/office/powerpoint/2010/main" val="266140013"/>
+      </p:ext>
+    </p:extLst>
+  </p:cSld>
+  <p:clrMapOvr>
+    <a:masterClrMapping/>
+  </p:clrMapOvr>
+  <p:transition>
+    <p:fade/>
+  </p:transition>
+</p:sld>
+</file>
+
+<file path=ppt/slides/slide6.xml><?xml version="1.0" encoding="utf-8"?>
+<p:sld xmlns:a="http://schemas.openxmlformats.org/drawingml/2006/main" xmlns:r="http://schemas.openxmlformats.org/officeDocument/2006/relationships" xmlns:p="http://schemas.openxmlformats.org/presentationml/2006/main">
+  <p:cSld>
+    <p:spTree>
+      <p:nvGrpSpPr>
+        <p:cNvPr id="1" name=""/>
+        <p:cNvGrpSpPr/>
+        <p:nvPr/>
+      </p:nvGrpSpPr>
+      <p:grpSpPr>
+        <a:xfrm>
+          <a:off x="0" y="0"/>
+          <a:ext cx="0" cy="0"/>
+          <a:chOff x="0" y="0"/>
+          <a:chExt cx="0" cy="0"/>
+        </a:xfrm>
+      </p:grpSpPr>
+      <p:sp>
+        <p:nvSpPr>
+          <p:cNvPr id="2" name="Title 1"/>
+          <p:cNvSpPr>
+            <a:spLocks noGrp="1"/>
+          </p:cNvSpPr>
+          <p:nvPr>
+            <p:ph type="ctrTitle"/>
+          </p:nvPr>
+        </p:nvSpPr>
+        <p:spPr>
+          <a:xfrm>
+            <a:off x="866856" y="889131"/>
+            <a:ext cx="10722224" cy="1195233"/>
+          </a:xfrm>
+        </p:spPr>
+        <p:txBody>
+          <a:bodyPr/>
+          <a:lstStyle/>
+          <a:p>
+            <a:r>
+              <a:rPr lang="fr-CA" b="1" dirty="0"/>
+              <a:t>Snapshot Debugger</a:t>
+            </a:r>
+            <a:endParaRPr lang="en-US" b="1" dirty="0"/>
+          </a:p>
+        </p:txBody>
+      </p:sp>
+      <p:sp>
+        <p:nvSpPr>
+          <p:cNvPr id="3" name="Title 1"/>
+          <p:cNvSpPr txBox="1">
+            <a:spLocks/>
+          </p:cNvSpPr>
+          <p:nvPr/>
+        </p:nvSpPr>
+        <p:spPr>
+          <a:xfrm>
+            <a:off x="882435" y="2980788"/>
+            <a:ext cx="10722224" cy="3286892"/>
+          </a:xfrm>
+          <a:prstGeom prst="rect">
+            <a:avLst/>
+          </a:prstGeom>
+        </p:spPr>
+        <p:txBody>
+          <a:bodyPr>
+            <a:noAutofit/>
+          </a:bodyPr>
+          <a:lstStyle>
+            <a:lvl1pPr algn="ctr" defTabSz="932372" rtl="0" eaLnBrk="1" latinLnBrk="0" hangingPunct="1">
+              <a:lnSpc>
+                <a:spcPct val="90000"/>
+              </a:lnSpc>
+              <a:spcBef>
+                <a:spcPct val="0"/>
+              </a:spcBef>
+              <a:buNone/>
+              <a:defRPr lang="en-US" sz="8159" b="0" kern="1200" cap="none" spc="-102" baseline="0">
+                <a:ln w="3175">
+                  <a:noFill/>
+                </a:ln>
+                <a:solidFill>
+                  <a:schemeClr val="bg1"/>
+                </a:solidFill>
+                <a:effectLst/>
+                <a:latin typeface="+mj-lt"/>
+                <a:ea typeface="+mn-ea"/>
+                <a:cs typeface="Segoe UI" pitchFamily="34" charset="0"/>
+              </a:defRPr>
+            </a:lvl1pPr>
+          </a:lstStyle>
+          <a:p>
+            <a:r>
+              <a:rPr lang="en-CA" sz="3921" dirty="0"/>
+              <a:t>Debug a production app in Visual Studio without blocking and in </a:t>
+            </a:r>
+            <a:r>
+              <a:rPr lang="en-CA" sz="3921" dirty="0" err="1"/>
+              <a:t>realtime</a:t>
+            </a:r>
+            <a:endParaRPr lang="en-CA" sz="3921" dirty="0"/>
+          </a:p>
+          <a:p>
+            <a:endParaRPr lang="en-CA" sz="3921" dirty="0"/>
+          </a:p>
+        </p:txBody>
+      </p:sp>
+    </p:spTree>
+    <p:extLst>
+      <p:ext uri="{BB962C8B-B14F-4D97-AF65-F5344CB8AC3E}">
+        <p14:creationId xmlns:p14="http://schemas.microsoft.com/office/powerpoint/2010/main" val="1008397223"/>
+      </p:ext>
+    </p:extLst>
+  </p:cSld>
+  <p:clrMapOvr>
+    <a:masterClrMapping/>
+  </p:clrMapOvr>
+  <p:transition>
+    <p:fade/>
+  </p:transition>
+</p:sld>
+</file>
+
+<file path=ppt/slides/slide7.xml><?xml version="1.0" encoding="utf-8"?>
+<p:sld xmlns:a="http://schemas.openxmlformats.org/drawingml/2006/main" xmlns:r="http://schemas.openxmlformats.org/officeDocument/2006/relationships" xmlns:p="http://schemas.openxmlformats.org/presentationml/2006/main">
+  <p:cSld>
+    <p:spTree>
+      <p:nvGrpSpPr>
+        <p:cNvPr id="1" name=""/>
+        <p:cNvGrpSpPr/>
+        <p:nvPr/>
+      </p:nvGrpSpPr>
+      <p:grpSpPr>
+        <a:xfrm>
+          <a:off x="0" y="0"/>
+          <a:ext cx="0" cy="0"/>
+          <a:chOff x="0" y="0"/>
+          <a:chExt cx="0" cy="0"/>
+        </a:xfrm>
+      </p:grpSpPr>
+      <p:pic>
+        <p:nvPicPr>
+          <p:cNvPr id="1026" name="Picture 2" descr="Image result for warning">
+            <a:extLst>
+              <a:ext uri="{FF2B5EF4-FFF2-40B4-BE49-F238E27FC236}">
+                <a16:creationId xmlns:a16="http://schemas.microsoft.com/office/drawing/2014/main" id="{D382161D-E550-4FBA-B7AD-EE1133BC43AF}"/>
+              </a:ext>
+            </a:extLst>
+          </p:cNvPr>
+          <p:cNvPicPr>
+            <a:picLocks noChangeAspect="1" noChangeArrowheads="1"/>
+          </p:cNvPicPr>
+          <p:nvPr/>
+        </p:nvPicPr>
+        <p:blipFill>
+          <a:blip r:embed="rId3" cstate="print">
+            <a:duotone>
+              <a:prstClr val="black"/>
+              <a:schemeClr val="tx2">
+                <a:tint val="45000"/>
+                <a:satMod val="400000"/>
+              </a:schemeClr>
+            </a:duotone>
+            <a:extLst>
+              <a:ext uri="{28A0092B-C50C-407E-A947-70E740481C1C}">
+                <a14:useLocalDpi xmlns:a14="http://schemas.microsoft.com/office/drawing/2010/main" val="0"/>
+              </a:ext>
+            </a:extLst>
+          </a:blip>
+          <a:srcRect/>
+          <a:stretch>
+            <a:fillRect/>
+          </a:stretch>
+        </p:blipFill>
+        <p:spPr bwMode="auto">
+          <a:xfrm>
+            <a:off x="911225" y="0"/>
+            <a:ext cx="10369550" cy="6858000"/>
+          </a:xfrm>
+          <a:prstGeom prst="rect">
+            <a:avLst/>
+          </a:prstGeom>
+          <a:noFill/>
+          <a:extLst>
+            <a:ext uri="{909E8E84-426E-40DD-AFC4-6F175D3DCCD1}">
+              <a14:hiddenFill xmlns:a14="http://schemas.microsoft.com/office/drawing/2010/main">
+                <a:solidFill>
+                  <a:srgbClr val="FFFFFF"/>
+                </a:solidFill>
+              </a14:hiddenFill>
+            </a:ext>
+          </a:extLst>
+        </p:spPr>
+      </p:pic>
+    </p:spTree>
+    <p:extLst>
+      <p:ext uri="{BB962C8B-B14F-4D97-AF65-F5344CB8AC3E}">
+        <p14:creationId xmlns:p14="http://schemas.microsoft.com/office/powerpoint/2010/main" val="1138914188"/>
+      </p:ext>
+    </p:extLst>
+  </p:cSld>
+  <p:clrMapOvr>
+    <a:masterClrMapping/>
+  </p:clrMapOvr>
+  <p:transition>
+    <p:fade/>
+  </p:transition>
+</p:sld>
+</file>
+
+<file path=ppt/slides/slide8.xml><?xml version="1.0" encoding="utf-8"?>
 <p:sld xmlns:a="http://schemas.openxmlformats.org/drawingml/2006/main" xmlns:r="http://schemas.openxmlformats.org/officeDocument/2006/relationships" xmlns:p="http://schemas.openxmlformats.org/presentationml/2006/main">
   <p:cSld>
     <p:spTree>
@@ -6764,52 +8041,46 @@
           <a:bodyPr/>
           <a:lstStyle/>
           <a:p>
-            <a:pPr marL="571500" indent="-571500">
-              <a:buFont typeface="Arial" panose="020B0604020202020204" pitchFamily="34" charset="0"/>
-              <a:buChar char="•"/>
-            </a:pPr>
-            <a:r>
-              <a:rPr lang="en-CA" dirty="0">
-                <a:hlinkClick r:id="rId3"/>
-              </a:rPr>
-              <a:t>Debug snapshots on exceptions in .NET apps</a:t>
-            </a:r>
-            <a:endParaRPr lang="en-CA" dirty="0"/>
-          </a:p>
-          <a:p>
-            <a:pPr marL="571500" indent="-571500">
-              <a:buFont typeface="Arial" panose="020B0604020202020204" pitchFamily="34" charset="0"/>
-              <a:buChar char="•"/>
-            </a:pPr>
-            <a:r>
-              <a:rPr lang="en-CA" dirty="0">
-                <a:hlinkClick r:id="rId4" action="ppaction://hlinkfile"/>
-              </a:rPr>
-              <a:t>Debug live ASP.NET Azure apps using the Snapshot Debugger</a:t>
-            </a:r>
-            <a:endParaRPr lang="en-CA" dirty="0"/>
-          </a:p>
-          <a:p>
-            <a:endParaRPr lang="en-US" dirty="0"/>
-          </a:p>
-          <a:p>
-            <a:pPr marL="571500" indent="-571500">
-              <a:buFont typeface="Arial" panose="020B0604020202020204" pitchFamily="34" charset="0"/>
-              <a:buChar char="•"/>
-            </a:pPr>
-            <a:endParaRPr lang="en-US" dirty="0"/>
-          </a:p>
-          <a:p>
-            <a:endParaRPr lang="en-US" dirty="0"/>
-          </a:p>
-          <a:p>
-            <a:endParaRPr lang="en-US" dirty="0"/>
-          </a:p>
-          <a:p>
-            <a:endParaRPr lang="en-US" dirty="0"/>
-          </a:p>
-          <a:p>
-            <a:endParaRPr lang="en-US" dirty="0"/>
+            <a:r>
+              <a:rPr lang="en-CA" sz="2400" dirty="0"/>
+              <a:t>Exception Snapshot: https://docs.microsoft.com/en-us/azure/application-insights/app-insights-snapshot-debugger</a:t>
+            </a:r>
+          </a:p>
+          <a:p>
+            <a:br>
+              <a:rPr lang="en-CA" sz="2400" dirty="0"/>
+            </a:br>
+            <a:r>
+              <a:rPr lang="en-CA" sz="2400" dirty="0"/>
+              <a:t>Snapshot Authorization: https://docs.microsoft.com/en-us/azure/application-insights/app-insights-snapshot-debugger#grant-permissions</a:t>
+            </a:r>
+          </a:p>
+          <a:p>
+            <a:br>
+              <a:rPr lang="en-CA" sz="2400" dirty="0"/>
+            </a:br>
+            <a:r>
+              <a:rPr lang="en-CA" sz="2400" dirty="0"/>
+              <a:t>Application Profiling: https://docs.microsoft.com/en-us/azure/application-insights/app-insights-profiler</a:t>
+            </a:r>
+          </a:p>
+          <a:p>
+            <a:br>
+              <a:rPr lang="en-CA" sz="2400" dirty="0"/>
+            </a:br>
+            <a:r>
+              <a:rPr lang="en-CA" sz="2400" dirty="0"/>
+              <a:t>Performance Test: https://docs.microsoft.com/en-us/vsts/load-test/app-service-web-app-performance-test</a:t>
+            </a:r>
+          </a:p>
+          <a:p>
+            <a:br>
+              <a:rPr lang="en-CA" sz="2400" dirty="0"/>
+            </a:br>
+            <a:r>
+              <a:rPr lang="en-CA" sz="2400" dirty="0"/>
+              <a:t>Snapshot Debugger: https://docs.microsoft.com/en-ca/visualstudio/debugger/debug-live-azure-applications</a:t>
+            </a:r>
           </a:p>
         </p:txBody>
       </p:sp>

</xml_diff>